<commit_message>
Added song lyric functionality
</commit_message>
<xml_diff>
--- a/testPower.pptx
+++ b/testPower.pptx
@@ -8,6 +8,8 @@
     <p:sldId id="256" r:id="rId2"/>
     <p:sldId id="257" r:id="rId7"/>
     <p:sldId id="258" r:id="rId8"/>
+    <p:sldId id="259" r:id="rId9"/>
+    <p:sldId id="260" r:id="rId10"/>
   </p:sldIdLst>
   <p:sldSz cx="12192000" cy="6858000"/>
   <p:notesSz cx="6858000" cy="9144000"/>
@@ -3060,8 +3062,8 @@
         </p:nvSpPr>
         <p:spPr>
           <a:xfrm>
-            <a:off x="871200" y="720000"/>
-            <a:ext cx="10443600" cy="5220000"/>
+            <a:off x="817200" y="1612800"/>
+            <a:ext cx="10515600" cy="3484800"/>
           </a:xfrm>
           <a:prstGeom prst="rect">
             <a:avLst/>
@@ -3069,104 +3071,21 @@
           <a:noFill/>
         </p:spPr>
         <p:txBody>
-          <a:bodyPr wrap="none">
+          <a:bodyPr wrap="none" anchor="ctr">
             <a:spAutoFit/>
           </a:bodyPr>
           <a:lstStyle/>
           <a:p>
             <a:pPr algn="ctr">
               <a:lnSpc>
-                <a:spcPct val="80000"/>
+                <a:spcPct val="90000"/>
               </a:lnSpc>
-              <a:spcAft>
-                <a:spcPts val="1000"/>
-              </a:spcAft>
-              <a:defRPr sz="5600">
-                <a:latin typeface="Calibri (Body)"/>
+              <a:defRPr sz="8000">
+                <a:latin typeface="Calibri Light (Headings)"/>
               </a:defRPr>
             </a:pPr>
             <a:r>
-              <a:t>Bless the Lord</a:t>
-            </a:r>
-          </a:p>
-          <a:p>
-            <a:pPr algn="ctr">
-              <a:lnSpc>
-                <a:spcPct val="80000"/>
-              </a:lnSpc>
-              <a:spcAft>
-                <a:spcPts val="1000"/>
-              </a:spcAft>
-              <a:defRPr sz="5600">
-                <a:latin typeface="Calibri (Body)"/>
-              </a:defRPr>
-            </a:pPr>
-            <a:r>
-              <a:t>Oh my soul, oh my soul</a:t>
-            </a:r>
-          </a:p>
-          <a:p>
-            <a:pPr algn="ctr">
-              <a:lnSpc>
-                <a:spcPct val="80000"/>
-              </a:lnSpc>
-              <a:spcAft>
-                <a:spcPts val="1000"/>
-              </a:spcAft>
-              <a:defRPr sz="5600">
-                <a:latin typeface="Calibri (Body)"/>
-              </a:defRPr>
-            </a:pPr>
-            <a:r>
-              <a:t>Worship his holy name</a:t>
-            </a:r>
-          </a:p>
-          <a:p>
-            <a:pPr algn="ctr">
-              <a:lnSpc>
-                <a:spcPct val="80000"/>
-              </a:lnSpc>
-              <a:spcAft>
-                <a:spcPts val="1000"/>
-              </a:spcAft>
-              <a:defRPr sz="5600">
-                <a:latin typeface="Calibri (Body)"/>
-              </a:defRPr>
-            </a:pPr>
-            <a:r>
-              <a:t>Sing like never before</a:t>
-            </a:r>
-          </a:p>
-          <a:p>
-            <a:pPr algn="ctr">
-              <a:lnSpc>
-                <a:spcPct val="80000"/>
-              </a:lnSpc>
-              <a:spcAft>
-                <a:spcPts val="1000"/>
-              </a:spcAft>
-              <a:defRPr sz="5600">
-                <a:latin typeface="Calibri (Body)"/>
-              </a:defRPr>
-            </a:pPr>
-            <a:r>
-              <a:t>Oh my soul</a:t>
-            </a:r>
-          </a:p>
-          <a:p>
-            <a:pPr algn="ctr">
-              <a:lnSpc>
-                <a:spcPct val="80000"/>
-              </a:lnSpc>
-              <a:spcAft>
-                <a:spcPts val="1000"/>
-              </a:spcAft>
-              <a:defRPr sz="5600">
-                <a:latin typeface="Calibri (Body)"/>
-              </a:defRPr>
-            </a:pPr>
-            <a:r>
-              <a:t>I’ll worship your holy name</a:t>
+              <a:t>Ave Maria</a:t>
             </a:r>
           </a:p>
         </p:txBody>
@@ -3218,16 +3137,12 @@
               <a:spcAft>
                 <a:spcPts val="1000"/>
               </a:spcAft>
-              <a:defRPr sz="5600">
+              <a:defRPr sz="6000">
                 <a:latin typeface="Calibri (Body)"/>
               </a:defRPr>
             </a:pPr>
             <a:r>
-              <a:t>The sun comes up, it’s a new day</a:t>
-            </a:r>
-            <a:br/>
-            <a:r>
-              <a:t> dawning</a:t>
+              <a:t>As I kneel before you</a:t>
             </a:r>
           </a:p>
           <a:p>
@@ -3238,12 +3153,12 @@
               <a:spcAft>
                 <a:spcPts val="1000"/>
               </a:spcAft>
-              <a:defRPr sz="5600">
+              <a:defRPr sz="6000">
                 <a:latin typeface="Calibri (Body)"/>
               </a:defRPr>
             </a:pPr>
             <a:r>
-              <a:t>It’s time to sing your song again</a:t>
+              <a:t> As I bow my head in prayer</a:t>
             </a:r>
           </a:p>
           <a:p>
@@ -3254,16 +3169,12 @@
               <a:spcAft>
                 <a:spcPts val="1000"/>
               </a:spcAft>
-              <a:defRPr sz="5600">
+              <a:defRPr sz="6000">
                 <a:latin typeface="Calibri (Body)"/>
               </a:defRPr>
             </a:pPr>
             <a:r>
-              <a:t>Whatever may pass and whatever</a:t>
-            </a:r>
-            <a:br/>
-            <a:r>
-              <a:t> lies before me</a:t>
+              <a:t> Take this day, make it yours</a:t>
             </a:r>
           </a:p>
           <a:p>
@@ -3274,16 +3185,230 @@
               <a:spcAft>
                 <a:spcPts val="1000"/>
               </a:spcAft>
-              <a:defRPr sz="5600">
+              <a:defRPr sz="6000">
                 <a:latin typeface="Calibri (Body)"/>
               </a:defRPr>
             </a:pPr>
             <a:r>
-              <a:t>Let me be singing when the</a:t>
+              <a:t> And fill me with your love</a:t>
+            </a:r>
+          </a:p>
+        </p:txBody>
+      </p:sp>
+    </p:spTree>
+  </p:cSld>
+  <p:clrMapOvr>
+    <a:masterClrMapping/>
+  </p:clrMapOvr>
+</p:sld>
+</file>
+
+<file path=ppt/slides/slide4.xml><?xml version="1.0" encoding="utf-8"?>
+<p:sld xmlns:a="http://schemas.openxmlformats.org/drawingml/2006/main" xmlns:p="http://schemas.openxmlformats.org/presentationml/2006/main" xmlns:r="http://schemas.openxmlformats.org/officeDocument/2006/relationships">
+  <p:cSld>
+    <p:spTree>
+      <p:nvGrpSpPr>
+        <p:cNvPr id="1" name=""/>
+        <p:cNvGrpSpPr/>
+        <p:nvPr/>
+      </p:nvGrpSpPr>
+      <p:grpSpPr/>
+      <p:sp>
+        <p:nvSpPr>
+          <p:cNvPr id="2" name="TextBox 1"/>
+          <p:cNvSpPr txBox="1"/>
+          <p:nvPr/>
+        </p:nvSpPr>
+        <p:spPr>
+          <a:xfrm>
+            <a:off x="871200" y="720000"/>
+            <a:ext cx="10443600" cy="5220000"/>
+          </a:xfrm>
+          <a:prstGeom prst="rect">
+            <a:avLst/>
+          </a:prstGeom>
+          <a:noFill/>
+        </p:spPr>
+        <p:txBody>
+          <a:bodyPr wrap="none">
+            <a:spAutoFit/>
+          </a:bodyPr>
+          <a:lstStyle/>
+          <a:p>
+            <a:pPr algn="ctr">
+              <a:lnSpc>
+                <a:spcPct val="80000"/>
+              </a:lnSpc>
+              <a:spcAft>
+                <a:spcPts val="1000"/>
+              </a:spcAft>
+              <a:defRPr sz="6000">
+                <a:latin typeface="Calibri (Body)"/>
+              </a:defRPr>
+            </a:pPr>
+            <a:r>
+              <a:t>Ave Maria</a:t>
+            </a:r>
+          </a:p>
+          <a:p>
+            <a:pPr algn="ctr">
+              <a:lnSpc>
+                <a:spcPct val="80000"/>
+              </a:lnSpc>
+              <a:spcAft>
+                <a:spcPts val="1000"/>
+              </a:spcAft>
+              <a:defRPr sz="6000">
+                <a:latin typeface="Calibri (Body)"/>
+              </a:defRPr>
+            </a:pPr>
+            <a:r>
+              <a:t> Gratia Plena</a:t>
+            </a:r>
+          </a:p>
+          <a:p>
+            <a:pPr algn="ctr">
+              <a:lnSpc>
+                <a:spcPct val="80000"/>
+              </a:lnSpc>
+              <a:spcAft>
+                <a:spcPts val="1000"/>
+              </a:spcAft>
+              <a:defRPr sz="6000">
+                <a:latin typeface="Calibri (Body)"/>
+              </a:defRPr>
+            </a:pPr>
+            <a:r>
+              <a:t> Dominus Tecum</a:t>
+            </a:r>
+          </a:p>
+          <a:p>
+            <a:pPr algn="ctr">
+              <a:lnSpc>
+                <a:spcPct val="80000"/>
+              </a:lnSpc>
+              <a:spcAft>
+                <a:spcPts val="1000"/>
+              </a:spcAft>
+              <a:defRPr sz="6000">
+                <a:latin typeface="Calibri (Body)"/>
+              </a:defRPr>
+            </a:pPr>
+            <a:r>
+              <a:t> Benedicta Tu</a:t>
+            </a:r>
+          </a:p>
+        </p:txBody>
+      </p:sp>
+    </p:spTree>
+  </p:cSld>
+  <p:clrMapOvr>
+    <a:masterClrMapping/>
+  </p:clrMapOvr>
+</p:sld>
+</file>
+
+<file path=ppt/slides/slide5.xml><?xml version="1.0" encoding="utf-8"?>
+<p:sld xmlns:a="http://schemas.openxmlformats.org/drawingml/2006/main" xmlns:p="http://schemas.openxmlformats.org/presentationml/2006/main" xmlns:r="http://schemas.openxmlformats.org/officeDocument/2006/relationships">
+  <p:cSld>
+    <p:spTree>
+      <p:nvGrpSpPr>
+        <p:cNvPr id="1" name=""/>
+        <p:cNvGrpSpPr/>
+        <p:nvPr/>
+      </p:nvGrpSpPr>
+      <p:grpSpPr/>
+      <p:sp>
+        <p:nvSpPr>
+          <p:cNvPr id="2" name="TextBox 1"/>
+          <p:cNvSpPr txBox="1"/>
+          <p:nvPr/>
+        </p:nvSpPr>
+        <p:spPr>
+          <a:xfrm>
+            <a:off x="871200" y="720000"/>
+            <a:ext cx="10443600" cy="5220000"/>
+          </a:xfrm>
+          <a:prstGeom prst="rect">
+            <a:avLst/>
+          </a:prstGeom>
+          <a:noFill/>
+        </p:spPr>
+        <p:txBody>
+          <a:bodyPr wrap="none">
+            <a:spAutoFit/>
+          </a:bodyPr>
+          <a:lstStyle/>
+          <a:p>
+            <a:pPr algn="ctr">
+              <a:lnSpc>
+                <a:spcPct val="80000"/>
+              </a:lnSpc>
+              <a:spcAft>
+                <a:spcPts val="1000"/>
+              </a:spcAft>
+              <a:defRPr sz="6000">
+                <a:latin typeface="Calibri (Body)"/>
+              </a:defRPr>
+            </a:pPr>
+            <a:r>
+              <a:t>All I have I give you</a:t>
+            </a:r>
+          </a:p>
+          <a:p>
+            <a:pPr algn="ctr">
+              <a:lnSpc>
+                <a:spcPct val="80000"/>
+              </a:lnSpc>
+              <a:spcAft>
+                <a:spcPts val="1000"/>
+              </a:spcAft>
+              <a:defRPr sz="6000">
+                <a:latin typeface="Calibri (Body)"/>
+              </a:defRPr>
+            </a:pPr>
+            <a:r>
+              <a:t> Every dream and wish are</a:t>
             </a:r>
             <a:br/>
             <a:r>
-              <a:t> evening comes</a:t>
+              <a:t> yours</a:t>
+            </a:r>
+          </a:p>
+          <a:p>
+            <a:pPr algn="ctr">
+              <a:lnSpc>
+                <a:spcPct val="80000"/>
+              </a:lnSpc>
+              <a:spcAft>
+                <a:spcPts val="1000"/>
+              </a:spcAft>
+              <a:defRPr sz="6000">
+                <a:latin typeface="Calibri (Body)"/>
+              </a:defRPr>
+            </a:pPr>
+            <a:r>
+              <a:t> Mother of Christ</a:t>
+            </a:r>
+          </a:p>
+          <a:p>
+            <a:pPr algn="ctr">
+              <a:lnSpc>
+                <a:spcPct val="80000"/>
+              </a:lnSpc>
+              <a:spcAft>
+                <a:spcPts val="1000"/>
+              </a:spcAft>
+              <a:defRPr sz="6000">
+                <a:latin typeface="Calibri (Body)"/>
+              </a:defRPr>
+            </a:pPr>
+            <a:r>
+              <a:t> Mother of mine, present them</a:t>
+            </a:r>
+            <a:br/>
+            <a:r>
+              <a:t> to the Lord</a:t>
             </a:r>
           </a:p>
         </p:txBody>

</xml_diff>